<commit_message>
finished up end of year presentation
</commit_message>
<xml_diff>
--- a/exploit dev.pptx
+++ b/exploit dev.pptx
@@ -5,10 +5,10 @@
     <p:sldMasterId id="2147483780" r:id="rId3"/>
   </p:sldMasterIdLst>
   <p:notesMasterIdLst>
-    <p:notesMasterId r:id="rId18"/>
+    <p:notesMasterId r:id="rId19"/>
   </p:notesMasterIdLst>
   <p:handoutMasterIdLst>
-    <p:handoutMasterId r:id="rId19"/>
+    <p:handoutMasterId r:id="rId20"/>
   </p:handoutMasterIdLst>
   <p:sldIdLst>
     <p:sldId id="256" r:id="rId4"/>
@@ -21,10 +21,11 @@
     <p:sldId id="263" r:id="rId11"/>
     <p:sldId id="269" r:id="rId12"/>
     <p:sldId id="264" r:id="rId13"/>
-    <p:sldId id="265" r:id="rId14"/>
-    <p:sldId id="266" r:id="rId15"/>
-    <p:sldId id="267" r:id="rId16"/>
-    <p:sldId id="268" r:id="rId17"/>
+    <p:sldId id="270" r:id="rId14"/>
+    <p:sldId id="265" r:id="rId15"/>
+    <p:sldId id="266" r:id="rId16"/>
+    <p:sldId id="267" r:id="rId17"/>
+    <p:sldId id="268" r:id="rId18"/>
   </p:sldIdLst>
   <p:sldSz cx="12192000" cy="6858000"/>
   <p:notesSz cx="6858000" cy="9144000"/>
@@ -123,6 +124,11 @@
       </a:defRPr>
     </a:lvl9pPr>
   </p:defaultTextStyle>
+  <p:extLst>
+    <p:ext uri="{EFAFB233-063F-42B5-8137-9DF3F51BA10A}">
+      <p15:sldGuideLst xmlns:p15="http://schemas.microsoft.com/office/powerpoint/2012/main"/>
+    </p:ext>
+  </p:extLst>
 </p:presentation>
 </file>
 
@@ -208,7 +214,7 @@
           <a:p>
             <a:fld id="{029F4E69-0BD2-430E-8A11-1794ED533C36}" type="datetimeFigureOut">
               <a:rPr lang="en-US" smtClean="0"/>
-              <a:t>12/3/2018</a:t>
+              <a:t>12/5/2018</a:t>
             </a:fld>
             <a:endParaRPr lang="en-US"/>
           </a:p>
@@ -373,7 +379,7 @@
           <a:p>
             <a:fld id="{D0A4E40D-53D3-4D80-A91D-91092446D3D0}" type="datetimeFigureOut">
               <a:rPr lang="en-US" smtClean="0"/>
-              <a:t>12/3/2018</a:t>
+              <a:t>12/5/2018</a:t>
             </a:fld>
             <a:endParaRPr lang="en-US"/>
           </a:p>
@@ -998,7 +1004,7 @@
     </p:spTree>
     <p:extLst>
       <p:ext uri="{BB962C8B-B14F-4D97-AF65-F5344CB8AC3E}">
-        <p14:creationId xmlns:p14="http://schemas.microsoft.com/office/powerpoint/2010/main" val="2795252136"/>
+        <p14:creationId xmlns:p14="http://schemas.microsoft.com/office/powerpoint/2010/main" val="2590367960"/>
       </p:ext>
     </p:extLst>
   </p:cSld>
@@ -1052,7 +1058,7 @@
           <a:bodyPr/>
           <a:lstStyle/>
           <a:p>
-            <a:endParaRPr lang="en-US" dirty="0"/>
+            <a:endParaRPr lang="en-US"/>
           </a:p>
         </p:txBody>
       </p:sp>
@@ -1120,7 +1126,7 @@
     </p:spTree>
     <p:extLst>
       <p:ext uri="{BB962C8B-B14F-4D97-AF65-F5344CB8AC3E}">
-        <p14:creationId xmlns:p14="http://schemas.microsoft.com/office/powerpoint/2010/main" val="1425170792"/>
+        <p14:creationId xmlns:p14="http://schemas.microsoft.com/office/powerpoint/2010/main" val="2795252136"/>
       </p:ext>
     </p:extLst>
   </p:cSld>
@@ -1174,7 +1180,7 @@
           <a:bodyPr/>
           <a:lstStyle/>
           <a:p>
-            <a:endParaRPr lang="en-US"/>
+            <a:endParaRPr lang="en-US" dirty="0"/>
           </a:p>
         </p:txBody>
       </p:sp>
@@ -1242,7 +1248,7 @@
     </p:spTree>
     <p:extLst>
       <p:ext uri="{BB962C8B-B14F-4D97-AF65-F5344CB8AC3E}">
-        <p14:creationId xmlns:p14="http://schemas.microsoft.com/office/powerpoint/2010/main" val="50702654"/>
+        <p14:creationId xmlns:p14="http://schemas.microsoft.com/office/powerpoint/2010/main" val="1425170792"/>
       </p:ext>
     </p:extLst>
   </p:cSld>
@@ -1296,7 +1302,7 @@
           <a:bodyPr/>
           <a:lstStyle/>
           <a:p>
-            <a:endParaRPr lang="en-US" dirty="0"/>
+            <a:endParaRPr lang="en-US"/>
           </a:p>
         </p:txBody>
       </p:sp>
@@ -1356,6 +1362,128 @@
             <a:fld id="{52C1AF43-EEED-4853-B930-D030E45A10B1}" type="slidenum">
               <a:rPr lang="en-US" smtClean="0"/>
               <a:t>14</a:t>
+            </a:fld>
+            <a:endParaRPr lang="en-US"/>
+          </a:p>
+        </p:txBody>
+      </p:sp>
+    </p:spTree>
+    <p:extLst>
+      <p:ext uri="{BB962C8B-B14F-4D97-AF65-F5344CB8AC3E}">
+        <p14:creationId xmlns:p14="http://schemas.microsoft.com/office/powerpoint/2010/main" val="50702654"/>
+      </p:ext>
+    </p:extLst>
+  </p:cSld>
+  <p:clrMapOvr>
+    <a:masterClrMapping/>
+  </p:clrMapOvr>
+</p:notes>
+</file>
+
+<file path=ppt/notesSlides/notesSlide15.xml><?xml version="1.0" encoding="utf-8"?>
+<p:notes xmlns:a="http://schemas.openxmlformats.org/drawingml/2006/main" xmlns:r="http://schemas.openxmlformats.org/officeDocument/2006/relationships" xmlns:p="http://schemas.openxmlformats.org/presentationml/2006/main">
+  <p:cSld>
+    <p:spTree>
+      <p:nvGrpSpPr>
+        <p:cNvPr id="1" name=""/>
+        <p:cNvGrpSpPr/>
+        <p:nvPr/>
+      </p:nvGrpSpPr>
+      <p:grpSpPr>
+        <a:xfrm>
+          <a:off x="0" y="0"/>
+          <a:ext cx="0" cy="0"/>
+          <a:chOff x="0" y="0"/>
+          <a:chExt cx="0" cy="0"/>
+        </a:xfrm>
+      </p:grpSpPr>
+      <p:sp>
+        <p:nvSpPr>
+          <p:cNvPr id="2" name="Slide Image Placeholder 1"/>
+          <p:cNvSpPr>
+            <a:spLocks noGrp="1" noRot="1" noChangeAspect="1"/>
+          </p:cNvSpPr>
+          <p:nvPr>
+            <p:ph type="sldImg"/>
+          </p:nvPr>
+        </p:nvSpPr>
+        <p:spPr/>
+      </p:sp>
+      <p:sp>
+        <p:nvSpPr>
+          <p:cNvPr id="3" name="Notes Placeholder 2"/>
+          <p:cNvSpPr>
+            <a:spLocks noGrp="1"/>
+          </p:cNvSpPr>
+          <p:nvPr>
+            <p:ph type="body" idx="1"/>
+          </p:nvPr>
+        </p:nvSpPr>
+        <p:spPr/>
+        <p:txBody>
+          <a:bodyPr/>
+          <a:lstStyle/>
+          <a:p>
+            <a:endParaRPr lang="en-US" dirty="0"/>
+          </a:p>
+        </p:txBody>
+      </p:sp>
+      <p:sp>
+        <p:nvSpPr>
+          <p:cNvPr id="4" name="Header Placeholder 3"/>
+          <p:cNvSpPr>
+            <a:spLocks noGrp="1"/>
+          </p:cNvSpPr>
+          <p:nvPr>
+            <p:ph type="hdr" sz="quarter" idx="10"/>
+          </p:nvPr>
+        </p:nvSpPr>
+        <p:spPr/>
+        <p:txBody>
+          <a:bodyPr/>
+          <a:lstStyle/>
+          <a:p>
+            <a:endParaRPr lang="en-US"/>
+          </a:p>
+        </p:txBody>
+      </p:sp>
+      <p:sp>
+        <p:nvSpPr>
+          <p:cNvPr id="5" name="Footer Placeholder 4"/>
+          <p:cNvSpPr>
+            <a:spLocks noGrp="1"/>
+          </p:cNvSpPr>
+          <p:nvPr>
+            <p:ph type="ftr" sz="quarter" idx="11"/>
+          </p:nvPr>
+        </p:nvSpPr>
+        <p:spPr/>
+        <p:txBody>
+          <a:bodyPr/>
+          <a:lstStyle/>
+          <a:p>
+            <a:endParaRPr lang="en-US"/>
+          </a:p>
+        </p:txBody>
+      </p:sp>
+      <p:sp>
+        <p:nvSpPr>
+          <p:cNvPr id="6" name="Slide Number Placeholder 5"/>
+          <p:cNvSpPr>
+            <a:spLocks noGrp="1"/>
+          </p:cNvSpPr>
+          <p:nvPr>
+            <p:ph type="sldNum" sz="quarter" idx="12"/>
+          </p:nvPr>
+        </p:nvSpPr>
+        <p:spPr/>
+        <p:txBody>
+          <a:bodyPr/>
+          <a:lstStyle/>
+          <a:p>
+            <a:fld id="{52C1AF43-EEED-4853-B930-D030E45A10B1}" type="slidenum">
+              <a:rPr lang="en-US" smtClean="0"/>
+              <a:t>15</a:t>
             </a:fld>
             <a:endParaRPr lang="en-US"/>
           </a:p>
@@ -2407,7 +2535,7 @@
           <a:noFill/>
           <a:extLst>
             <a:ext uri="{909E8E84-426E-40dd-AFC4-6F175D3DCCD1}">
-              <a14:hiddenFill xmlns:a14="http://schemas.microsoft.com/office/drawing/2010/main" xmlns="">
+              <a14:hiddenFill xmlns="" xmlns:a14="http://schemas.microsoft.com/office/drawing/2010/main">
                 <a:solidFill>
                   <a:srgbClr val="FFFFFF"/>
                 </a:solidFill>
@@ -2466,7 +2594,7 @@
             </a:ln>
             <a:extLst>
               <a:ext uri="{91240B29-F687-4f45-9708-019B960494DF}">
-                <a14:hiddenLine xmlns:a14="http://schemas.microsoft.com/office/drawing/2010/main" xmlns="" w="9525">
+                <a14:hiddenLine xmlns="" xmlns:a14="http://schemas.microsoft.com/office/drawing/2010/main" w="9525">
                   <a:solidFill>
                     <a:srgbClr val="000000"/>
                   </a:solidFill>
@@ -2556,7 +2684,7 @@
             </a:ln>
             <a:extLst>
               <a:ext uri="{91240B29-F687-4f45-9708-019B960494DF}">
-                <a14:hiddenLine xmlns:a14="http://schemas.microsoft.com/office/drawing/2010/main" xmlns="" w="9525">
+                <a14:hiddenLine xmlns="" xmlns:a14="http://schemas.microsoft.com/office/drawing/2010/main" w="9525">
                   <a:solidFill>
                     <a:srgbClr val="000000"/>
                   </a:solidFill>
@@ -2646,7 +2774,7 @@
             </a:ln>
             <a:extLst>
               <a:ext uri="{91240B29-F687-4f45-9708-019B960494DF}">
-                <a14:hiddenLine xmlns:a14="http://schemas.microsoft.com/office/drawing/2010/main" xmlns="" w="9525">
+                <a14:hiddenLine xmlns="" xmlns:a14="http://schemas.microsoft.com/office/drawing/2010/main" w="9525">
                   <a:solidFill>
                     <a:srgbClr val="000000"/>
                   </a:solidFill>
@@ -2680,7 +2808,7 @@
             </a:ln>
             <a:extLst>
               <a:ext uri="{91240B29-F687-4f45-9708-019B960494DF}">
-                <a14:hiddenLine xmlns:a14="http://schemas.microsoft.com/office/drawing/2010/main" xmlns="" w="9525">
+                <a14:hiddenLine xmlns="" xmlns:a14="http://schemas.microsoft.com/office/drawing/2010/main" w="9525">
                   <a:solidFill>
                     <a:srgbClr val="000000"/>
                   </a:solidFill>
@@ -2770,7 +2898,7 @@
             </a:ln>
             <a:extLst>
               <a:ext uri="{91240B29-F687-4f45-9708-019B960494DF}">
-                <a14:hiddenLine xmlns:a14="http://schemas.microsoft.com/office/drawing/2010/main" xmlns="" w="9525">
+                <a14:hiddenLine xmlns="" xmlns:a14="http://schemas.microsoft.com/office/drawing/2010/main" w="9525">
                   <a:solidFill>
                     <a:srgbClr val="000000"/>
                   </a:solidFill>
@@ -2832,7 +2960,7 @@
             </a:ln>
             <a:extLst>
               <a:ext uri="{91240B29-F687-4f45-9708-019B960494DF}">
-                <a14:hiddenLine xmlns:a14="http://schemas.microsoft.com/office/drawing/2010/main" xmlns="" w="9525">
+                <a14:hiddenLine xmlns="" xmlns:a14="http://schemas.microsoft.com/office/drawing/2010/main" w="9525">
                   <a:solidFill>
                     <a:srgbClr val="000000"/>
                   </a:solidFill>
@@ -2894,7 +3022,7 @@
             </a:ln>
             <a:extLst>
               <a:ext uri="{91240B29-F687-4f45-9708-019B960494DF}">
-                <a14:hiddenLine xmlns:a14="http://schemas.microsoft.com/office/drawing/2010/main" xmlns="" w="9525">
+                <a14:hiddenLine xmlns="" xmlns:a14="http://schemas.microsoft.com/office/drawing/2010/main" w="9525">
                   <a:solidFill>
                     <a:srgbClr val="000000"/>
                   </a:solidFill>
@@ -2984,7 +3112,7 @@
             </a:ln>
             <a:extLst>
               <a:ext uri="{91240B29-F687-4f45-9708-019B960494DF}">
-                <a14:hiddenLine xmlns:a14="http://schemas.microsoft.com/office/drawing/2010/main" xmlns="" w="9525">
+                <a14:hiddenLine xmlns="" xmlns:a14="http://schemas.microsoft.com/office/drawing/2010/main" w="9525">
                   <a:solidFill>
                     <a:srgbClr val="000000"/>
                   </a:solidFill>
@@ -3046,7 +3174,7 @@
             </a:ln>
             <a:extLst>
               <a:ext uri="{91240B29-F687-4f45-9708-019B960494DF}">
-                <a14:hiddenLine xmlns:a14="http://schemas.microsoft.com/office/drawing/2010/main" xmlns="" w="9525">
+                <a14:hiddenLine xmlns="" xmlns:a14="http://schemas.microsoft.com/office/drawing/2010/main" w="9525">
                   <a:solidFill>
                     <a:srgbClr val="000000"/>
                   </a:solidFill>
@@ -3108,7 +3236,7 @@
             </a:ln>
             <a:extLst>
               <a:ext uri="{91240B29-F687-4f45-9708-019B960494DF}">
-                <a14:hiddenLine xmlns:a14="http://schemas.microsoft.com/office/drawing/2010/main" xmlns="" w="9525">
+                <a14:hiddenLine xmlns="" xmlns:a14="http://schemas.microsoft.com/office/drawing/2010/main" w="9525">
                   <a:solidFill>
                     <a:srgbClr val="000000"/>
                   </a:solidFill>
@@ -3198,7 +3326,7 @@
             </a:ln>
             <a:extLst>
               <a:ext uri="{91240B29-F687-4f45-9708-019B960494DF}">
-                <a14:hiddenLine xmlns:a14="http://schemas.microsoft.com/office/drawing/2010/main" xmlns="" w="9525">
+                <a14:hiddenLine xmlns="" xmlns:a14="http://schemas.microsoft.com/office/drawing/2010/main" w="9525">
                   <a:solidFill>
                     <a:srgbClr val="000000"/>
                   </a:solidFill>
@@ -3288,7 +3416,7 @@
             </a:ln>
             <a:extLst>
               <a:ext uri="{91240B29-F687-4f45-9708-019B960494DF}">
-                <a14:hiddenLine xmlns:a14="http://schemas.microsoft.com/office/drawing/2010/main" xmlns="" w="9525">
+                <a14:hiddenLine xmlns="" xmlns:a14="http://schemas.microsoft.com/office/drawing/2010/main" w="9525">
                   <a:solidFill>
                     <a:srgbClr val="000000"/>
                   </a:solidFill>
@@ -3350,7 +3478,7 @@
             </a:ln>
             <a:extLst>
               <a:ext uri="{91240B29-F687-4f45-9708-019B960494DF}">
-                <a14:hiddenLine xmlns:a14="http://schemas.microsoft.com/office/drawing/2010/main" xmlns="" w="9525">
+                <a14:hiddenLine xmlns="" xmlns:a14="http://schemas.microsoft.com/office/drawing/2010/main" w="9525">
                   <a:solidFill>
                     <a:srgbClr val="000000"/>
                   </a:solidFill>
@@ -3460,7 +3588,7 @@
             </a:ln>
             <a:extLst>
               <a:ext uri="{91240B29-F687-4f45-9708-019B960494DF}">
-                <a14:hiddenLine xmlns:a14="http://schemas.microsoft.com/office/drawing/2010/main" xmlns="" w="9525">
+                <a14:hiddenLine xmlns="" xmlns:a14="http://schemas.microsoft.com/office/drawing/2010/main" w="9525">
                   <a:solidFill>
                     <a:srgbClr val="000000"/>
                   </a:solidFill>
@@ -3522,7 +3650,7 @@
             </a:ln>
             <a:extLst>
               <a:ext uri="{91240B29-F687-4f45-9708-019B960494DF}">
-                <a14:hiddenLine xmlns:a14="http://schemas.microsoft.com/office/drawing/2010/main" xmlns="" w="9525">
+                <a14:hiddenLine xmlns="" xmlns:a14="http://schemas.microsoft.com/office/drawing/2010/main" w="9525">
                   <a:solidFill>
                     <a:srgbClr val="000000"/>
                   </a:solidFill>
@@ -3612,7 +3740,7 @@
             </a:ln>
             <a:extLst>
               <a:ext uri="{91240B29-F687-4f45-9708-019B960494DF}">
-                <a14:hiddenLine xmlns:a14="http://schemas.microsoft.com/office/drawing/2010/main" xmlns="" w="9525">
+                <a14:hiddenLine xmlns="" xmlns:a14="http://schemas.microsoft.com/office/drawing/2010/main" w="9525">
                   <a:solidFill>
                     <a:srgbClr val="000000"/>
                   </a:solidFill>
@@ -3702,7 +3830,7 @@
             </a:ln>
             <a:extLst>
               <a:ext uri="{91240B29-F687-4f45-9708-019B960494DF}">
-                <a14:hiddenLine xmlns:a14="http://schemas.microsoft.com/office/drawing/2010/main" xmlns="" w="9525">
+                <a14:hiddenLine xmlns="" xmlns:a14="http://schemas.microsoft.com/office/drawing/2010/main" w="9525">
                   <a:solidFill>
                     <a:srgbClr val="000000"/>
                   </a:solidFill>
@@ -3764,7 +3892,7 @@
             </a:ln>
             <a:extLst>
               <a:ext uri="{91240B29-F687-4f45-9708-019B960494DF}">
-                <a14:hiddenLine xmlns:a14="http://schemas.microsoft.com/office/drawing/2010/main" xmlns="" w="9525">
+                <a14:hiddenLine xmlns="" xmlns:a14="http://schemas.microsoft.com/office/drawing/2010/main" w="9525">
                   <a:solidFill>
                     <a:srgbClr val="000000"/>
                   </a:solidFill>
@@ -3854,7 +3982,7 @@
             </a:ln>
             <a:extLst>
               <a:ext uri="{91240B29-F687-4f45-9708-019B960494DF}">
-                <a14:hiddenLine xmlns:a14="http://schemas.microsoft.com/office/drawing/2010/main" xmlns="" w="9525">
+                <a14:hiddenLine xmlns="" xmlns:a14="http://schemas.microsoft.com/office/drawing/2010/main" w="9525">
                   <a:solidFill>
                     <a:srgbClr val="000000"/>
                   </a:solidFill>
@@ -3944,7 +4072,7 @@
             </a:ln>
             <a:extLst>
               <a:ext uri="{91240B29-F687-4f45-9708-019B960494DF}">
-                <a14:hiddenLine xmlns:a14="http://schemas.microsoft.com/office/drawing/2010/main" xmlns="" w="9525">
+                <a14:hiddenLine xmlns="" xmlns:a14="http://schemas.microsoft.com/office/drawing/2010/main" w="9525">
                   <a:solidFill>
                     <a:srgbClr val="000000"/>
                   </a:solidFill>
@@ -4000,7 +4128,7 @@
             </a:ln>
             <a:extLst>
               <a:ext uri="{91240B29-F687-4f45-9708-019B960494DF}">
-                <a14:hiddenLine xmlns:a14="http://schemas.microsoft.com/office/drawing/2010/main" xmlns="" w="9525">
+                <a14:hiddenLine xmlns="" xmlns:a14="http://schemas.microsoft.com/office/drawing/2010/main" w="9525">
                   <a:solidFill>
                     <a:srgbClr val="000000"/>
                   </a:solidFill>
@@ -4090,7 +4218,7 @@
             </a:ln>
             <a:extLst>
               <a:ext uri="{91240B29-F687-4f45-9708-019B960494DF}">
-                <a14:hiddenLine xmlns:a14="http://schemas.microsoft.com/office/drawing/2010/main" xmlns="" w="9525">
+                <a14:hiddenLine xmlns="" xmlns:a14="http://schemas.microsoft.com/office/drawing/2010/main" w="9525">
                   <a:solidFill>
                     <a:srgbClr val="000000"/>
                   </a:solidFill>
@@ -4146,7 +4274,7 @@
             </a:ln>
             <a:extLst>
               <a:ext uri="{91240B29-F687-4f45-9708-019B960494DF}">
-                <a14:hiddenLine xmlns:a14="http://schemas.microsoft.com/office/drawing/2010/main" xmlns="" w="9525">
+                <a14:hiddenLine xmlns="" xmlns:a14="http://schemas.microsoft.com/office/drawing/2010/main" w="9525">
                   <a:solidFill>
                     <a:srgbClr val="000000"/>
                   </a:solidFill>
@@ -4236,7 +4364,7 @@
             </a:ln>
             <a:extLst>
               <a:ext uri="{91240B29-F687-4f45-9708-019B960494DF}">
-                <a14:hiddenLine xmlns:a14="http://schemas.microsoft.com/office/drawing/2010/main" xmlns="" w="9525">
+                <a14:hiddenLine xmlns="" xmlns:a14="http://schemas.microsoft.com/office/drawing/2010/main" w="9525">
                   <a:solidFill>
                     <a:srgbClr val="000000"/>
                   </a:solidFill>
@@ -4304,7 +4432,7 @@
             </a:ln>
             <a:extLst>
               <a:ext uri="{91240B29-F687-4f45-9708-019B960494DF}">
-                <a14:hiddenLine xmlns:a14="http://schemas.microsoft.com/office/drawing/2010/main" xmlns="" w="9525">
+                <a14:hiddenLine xmlns="" xmlns:a14="http://schemas.microsoft.com/office/drawing/2010/main" w="9525">
                   <a:solidFill>
                     <a:srgbClr val="000000"/>
                   </a:solidFill>
@@ -4394,7 +4522,7 @@
             </a:ln>
             <a:extLst>
               <a:ext uri="{91240B29-F687-4f45-9708-019B960494DF}">
-                <a14:hiddenLine xmlns:a14="http://schemas.microsoft.com/office/drawing/2010/main" xmlns="" w="9525">
+                <a14:hiddenLine xmlns="" xmlns:a14="http://schemas.microsoft.com/office/drawing/2010/main" w="9525">
                   <a:solidFill>
                     <a:srgbClr val="000000"/>
                   </a:solidFill>
@@ -4462,7 +4590,7 @@
             </a:ln>
             <a:extLst>
               <a:ext uri="{91240B29-F687-4f45-9708-019B960494DF}">
-                <a14:hiddenLine xmlns:a14="http://schemas.microsoft.com/office/drawing/2010/main" xmlns="" w="9525">
+                <a14:hiddenLine xmlns="" xmlns:a14="http://schemas.microsoft.com/office/drawing/2010/main" w="9525">
                   <a:solidFill>
                     <a:srgbClr val="000000"/>
                   </a:solidFill>
@@ -4552,7 +4680,7 @@
             </a:ln>
             <a:extLst>
               <a:ext uri="{91240B29-F687-4f45-9708-019B960494DF}">
-                <a14:hiddenLine xmlns:a14="http://schemas.microsoft.com/office/drawing/2010/main" xmlns="" w="9525">
+                <a14:hiddenLine xmlns="" xmlns:a14="http://schemas.microsoft.com/office/drawing/2010/main" w="9525">
                   <a:solidFill>
                     <a:srgbClr val="000000"/>
                   </a:solidFill>
@@ -4586,7 +4714,7 @@
             </a:ln>
             <a:extLst>
               <a:ext uri="{91240B29-F687-4f45-9708-019B960494DF}">
-                <a14:hiddenLine xmlns:a14="http://schemas.microsoft.com/office/drawing/2010/main" xmlns="" w="9525">
+                <a14:hiddenLine xmlns="" xmlns:a14="http://schemas.microsoft.com/office/drawing/2010/main" w="9525">
                   <a:solidFill>
                     <a:srgbClr val="000000"/>
                   </a:solidFill>
@@ -4676,7 +4804,7 @@
             </a:ln>
             <a:extLst>
               <a:ext uri="{91240B29-F687-4f45-9708-019B960494DF}">
-                <a14:hiddenLine xmlns:a14="http://schemas.microsoft.com/office/drawing/2010/main" xmlns="" w="9525">
+                <a14:hiddenLine xmlns="" xmlns:a14="http://schemas.microsoft.com/office/drawing/2010/main" w="9525">
                   <a:solidFill>
                     <a:srgbClr val="000000"/>
                   </a:solidFill>
@@ -4738,7 +4866,7 @@
             </a:ln>
             <a:extLst>
               <a:ext uri="{91240B29-F687-4f45-9708-019B960494DF}">
-                <a14:hiddenLine xmlns:a14="http://schemas.microsoft.com/office/drawing/2010/main" xmlns="" w="9525">
+                <a14:hiddenLine xmlns="" xmlns:a14="http://schemas.microsoft.com/office/drawing/2010/main" w="9525">
                   <a:solidFill>
                     <a:srgbClr val="000000"/>
                   </a:solidFill>
@@ -4800,7 +4928,7 @@
             </a:ln>
             <a:extLst>
               <a:ext uri="{91240B29-F687-4f45-9708-019B960494DF}">
-                <a14:hiddenLine xmlns:a14="http://schemas.microsoft.com/office/drawing/2010/main" xmlns="" w="9525">
+                <a14:hiddenLine xmlns="" xmlns:a14="http://schemas.microsoft.com/office/drawing/2010/main" w="9525">
                   <a:solidFill>
                     <a:srgbClr val="000000"/>
                   </a:solidFill>
@@ -4890,7 +5018,7 @@
             </a:ln>
             <a:extLst>
               <a:ext uri="{91240B29-F687-4f45-9708-019B960494DF}">
-                <a14:hiddenLine xmlns:a14="http://schemas.microsoft.com/office/drawing/2010/main" xmlns="" w="9525">
+                <a14:hiddenLine xmlns="" xmlns:a14="http://schemas.microsoft.com/office/drawing/2010/main" w="9525">
                   <a:solidFill>
                     <a:srgbClr val="000000"/>
                   </a:solidFill>
@@ -4958,7 +5086,7 @@
             </a:ln>
             <a:extLst>
               <a:ext uri="{91240B29-F687-4f45-9708-019B960494DF}">
-                <a14:hiddenLine xmlns:a14="http://schemas.microsoft.com/office/drawing/2010/main" xmlns="" w="9525">
+                <a14:hiddenLine xmlns="" xmlns:a14="http://schemas.microsoft.com/office/drawing/2010/main" w="9525">
                   <a:solidFill>
                     <a:srgbClr val="000000"/>
                   </a:solidFill>
@@ -5020,7 +5148,7 @@
             </a:ln>
             <a:extLst>
               <a:ext uri="{91240B29-F687-4f45-9708-019B960494DF}">
-                <a14:hiddenLine xmlns:a14="http://schemas.microsoft.com/office/drawing/2010/main" xmlns="" w="9525">
+                <a14:hiddenLine xmlns="" xmlns:a14="http://schemas.microsoft.com/office/drawing/2010/main" w="9525">
                   <a:solidFill>
                     <a:srgbClr val="000000"/>
                   </a:solidFill>
@@ -5110,7 +5238,7 @@
             </a:ln>
             <a:extLst>
               <a:ext uri="{91240B29-F687-4f45-9708-019B960494DF}">
-                <a14:hiddenLine xmlns:a14="http://schemas.microsoft.com/office/drawing/2010/main" xmlns="" w="9525">
+                <a14:hiddenLine xmlns="" xmlns:a14="http://schemas.microsoft.com/office/drawing/2010/main" w="9525">
                   <a:solidFill>
                     <a:srgbClr val="000000"/>
                   </a:solidFill>
@@ -5172,7 +5300,7 @@
             </a:ln>
             <a:extLst>
               <a:ext uri="{91240B29-F687-4f45-9708-019B960494DF}">
-                <a14:hiddenLine xmlns:a14="http://schemas.microsoft.com/office/drawing/2010/main" xmlns="" w="9525">
+                <a14:hiddenLine xmlns="" xmlns:a14="http://schemas.microsoft.com/office/drawing/2010/main" w="9525">
                   <a:solidFill>
                     <a:srgbClr val="000000"/>
                   </a:solidFill>
@@ -5262,7 +5390,7 @@
             </a:ln>
             <a:extLst>
               <a:ext uri="{91240B29-F687-4f45-9708-019B960494DF}">
-                <a14:hiddenLine xmlns:a14="http://schemas.microsoft.com/office/drawing/2010/main" xmlns="" w="9525">
+                <a14:hiddenLine xmlns="" xmlns:a14="http://schemas.microsoft.com/office/drawing/2010/main" w="9525">
                   <a:solidFill>
                     <a:srgbClr val="000000"/>
                   </a:solidFill>
@@ -5324,7 +5452,7 @@
             </a:ln>
             <a:extLst>
               <a:ext uri="{91240B29-F687-4f45-9708-019B960494DF}">
-                <a14:hiddenLine xmlns:a14="http://schemas.microsoft.com/office/drawing/2010/main" xmlns="" w="9525">
+                <a14:hiddenLine xmlns="" xmlns:a14="http://schemas.microsoft.com/office/drawing/2010/main" w="9525">
                   <a:solidFill>
                     <a:srgbClr val="000000"/>
                   </a:solidFill>
@@ -5414,7 +5542,7 @@
             </a:ln>
             <a:extLst>
               <a:ext uri="{91240B29-F687-4f45-9708-019B960494DF}">
-                <a14:hiddenLine xmlns:a14="http://schemas.microsoft.com/office/drawing/2010/main" xmlns="" w="9525">
+                <a14:hiddenLine xmlns="" xmlns:a14="http://schemas.microsoft.com/office/drawing/2010/main" w="9525">
                   <a:solidFill>
                     <a:srgbClr val="000000"/>
                   </a:solidFill>
@@ -5448,7 +5576,7 @@
             </a:ln>
             <a:extLst>
               <a:ext uri="{91240B29-F687-4f45-9708-019B960494DF}">
-                <a14:hiddenLine xmlns:a14="http://schemas.microsoft.com/office/drawing/2010/main" xmlns="" w="9525">
+                <a14:hiddenLine xmlns="" xmlns:a14="http://schemas.microsoft.com/office/drawing/2010/main" w="9525">
                   <a:solidFill>
                     <a:srgbClr val="000000"/>
                   </a:solidFill>
@@ -5513,7 +5641,7 @@
             </a:ln>
             <a:extLst>
               <a:ext uri="{91240B29-F687-4f45-9708-019B960494DF}">
-                <a14:hiddenLine xmlns:a14="http://schemas.microsoft.com/office/drawing/2010/main" xmlns="" w="9525">
+                <a14:hiddenLine xmlns="" xmlns:a14="http://schemas.microsoft.com/office/drawing/2010/main" w="9525">
                   <a:solidFill>
                     <a:srgbClr val="000000"/>
                   </a:solidFill>
@@ -5603,7 +5731,7 @@
             </a:ln>
             <a:extLst>
               <a:ext uri="{91240B29-F687-4f45-9708-019B960494DF}">
-                <a14:hiddenLine xmlns:a14="http://schemas.microsoft.com/office/drawing/2010/main" xmlns="" w="9525">
+                <a14:hiddenLine xmlns="" xmlns:a14="http://schemas.microsoft.com/office/drawing/2010/main" w="9525">
                   <a:solidFill>
                     <a:srgbClr val="000000"/>
                   </a:solidFill>
@@ -5665,7 +5793,7 @@
             </a:ln>
             <a:extLst>
               <a:ext uri="{91240B29-F687-4f45-9708-019B960494DF}">
-                <a14:hiddenLine xmlns:a14="http://schemas.microsoft.com/office/drawing/2010/main" xmlns="" w="9525">
+                <a14:hiddenLine xmlns="" xmlns:a14="http://schemas.microsoft.com/office/drawing/2010/main" w="9525">
                   <a:solidFill>
                     <a:srgbClr val="000000"/>
                   </a:solidFill>
@@ -5755,7 +5883,7 @@
             </a:ln>
             <a:extLst>
               <a:ext uri="{91240B29-F687-4f45-9708-019B960494DF}">
-                <a14:hiddenLine xmlns:a14="http://schemas.microsoft.com/office/drawing/2010/main" xmlns="" w="9525">
+                <a14:hiddenLine xmlns="" xmlns:a14="http://schemas.microsoft.com/office/drawing/2010/main" w="9525">
                   <a:solidFill>
                     <a:srgbClr val="000000"/>
                   </a:solidFill>
@@ -5845,7 +5973,7 @@
             </a:ln>
             <a:extLst>
               <a:ext uri="{91240B29-F687-4f45-9708-019B960494DF}">
-                <a14:hiddenLine xmlns:a14="http://schemas.microsoft.com/office/drawing/2010/main" xmlns="" w="9525">
+                <a14:hiddenLine xmlns="" xmlns:a14="http://schemas.microsoft.com/office/drawing/2010/main" w="9525">
                   <a:solidFill>
                     <a:srgbClr val="000000"/>
                   </a:solidFill>
@@ -5910,7 +6038,7 @@
             </a:ln>
             <a:extLst>
               <a:ext uri="{91240B29-F687-4f45-9708-019B960494DF}">
-                <a14:hiddenLine xmlns:a14="http://schemas.microsoft.com/office/drawing/2010/main" xmlns="" w="9525">
+                <a14:hiddenLine xmlns="" xmlns:a14="http://schemas.microsoft.com/office/drawing/2010/main" w="9525">
                   <a:solidFill>
                     <a:srgbClr val="000000"/>
                   </a:solidFill>
@@ -5972,7 +6100,7 @@
             </a:ln>
             <a:extLst>
               <a:ext uri="{91240B29-F687-4f45-9708-019B960494DF}">
-                <a14:hiddenLine xmlns:a14="http://schemas.microsoft.com/office/drawing/2010/main" xmlns="" w="9525">
+                <a14:hiddenLine xmlns="" xmlns:a14="http://schemas.microsoft.com/office/drawing/2010/main" w="9525">
                   <a:solidFill>
                     <a:srgbClr val="000000"/>
                   </a:solidFill>
@@ -6062,7 +6190,7 @@
             </a:ln>
             <a:extLst>
               <a:ext uri="{91240B29-F687-4f45-9708-019B960494DF}">
-                <a14:hiddenLine xmlns:a14="http://schemas.microsoft.com/office/drawing/2010/main" xmlns="" w="9525">
+                <a14:hiddenLine xmlns="" xmlns:a14="http://schemas.microsoft.com/office/drawing/2010/main" w="9525">
                   <a:solidFill>
                     <a:srgbClr val="000000"/>
                   </a:solidFill>
@@ -6152,7 +6280,7 @@
             </a:ln>
             <a:extLst>
               <a:ext uri="{91240B29-F687-4f45-9708-019B960494DF}">
-                <a14:hiddenLine xmlns:a14="http://schemas.microsoft.com/office/drawing/2010/main" xmlns="" w="9525">
+                <a14:hiddenLine xmlns="" xmlns:a14="http://schemas.microsoft.com/office/drawing/2010/main" w="9525">
                   <a:solidFill>
                     <a:srgbClr val="000000"/>
                   </a:solidFill>
@@ -6214,7 +6342,7 @@
             </a:ln>
             <a:extLst>
               <a:ext uri="{91240B29-F687-4f45-9708-019B960494DF}">
-                <a14:hiddenLine xmlns:a14="http://schemas.microsoft.com/office/drawing/2010/main" xmlns="" w="9525">
+                <a14:hiddenLine xmlns="" xmlns:a14="http://schemas.microsoft.com/office/drawing/2010/main" w="9525">
                   <a:solidFill>
                     <a:srgbClr val="000000"/>
                   </a:solidFill>
@@ -6334,7 +6462,7 @@
             </a:ln>
             <a:extLst>
               <a:ext uri="{91240B29-F687-4f45-9708-019B960494DF}">
-                <a14:hiddenLine xmlns:a14="http://schemas.microsoft.com/office/drawing/2010/main" xmlns="" w="9525">
+                <a14:hiddenLine xmlns="" xmlns:a14="http://schemas.microsoft.com/office/drawing/2010/main" w="9525">
                   <a:solidFill>
                     <a:srgbClr val="000000"/>
                   </a:solidFill>
@@ -6402,7 +6530,7 @@
             </a:ln>
             <a:extLst>
               <a:ext uri="{91240B29-F687-4f45-9708-019B960494DF}">
-                <a14:hiddenLine xmlns:a14="http://schemas.microsoft.com/office/drawing/2010/main" xmlns="" w="9525">
+                <a14:hiddenLine xmlns="" xmlns:a14="http://schemas.microsoft.com/office/drawing/2010/main" w="9525">
                   <a:solidFill>
                     <a:srgbClr val="000000"/>
                   </a:solidFill>
@@ -6492,7 +6620,7 @@
             </a:ln>
             <a:extLst>
               <a:ext uri="{91240B29-F687-4f45-9708-019B960494DF}">
-                <a14:hiddenLine xmlns:a14="http://schemas.microsoft.com/office/drawing/2010/main" xmlns="" w="9525">
+                <a14:hiddenLine xmlns="" xmlns:a14="http://schemas.microsoft.com/office/drawing/2010/main" w="9525">
                   <a:solidFill>
                     <a:srgbClr val="000000"/>
                   </a:solidFill>
@@ -6632,7 +6760,7 @@
           <a:p>
             <a:fld id="{06CA6F89-023D-45A4-BD39-B27B360D9626}" type="datetimeFigureOut">
               <a:rPr lang="en-US" smtClean="0"/>
-              <a:t>12/3/2018</a:t>
+              <a:t>12/5/2018</a:t>
             </a:fld>
             <a:endParaRPr lang="en-US"/>
           </a:p>
@@ -6904,7 +7032,7 @@
           <a:p>
             <a:fld id="{06CA6F89-023D-45A4-BD39-B27B360D9626}" type="datetimeFigureOut">
               <a:rPr lang="en-US" smtClean="0"/>
-              <a:t>12/3/2018</a:t>
+              <a:t>12/5/2018</a:t>
             </a:fld>
             <a:endParaRPr lang="en-US"/>
           </a:p>
@@ -7100,7 +7228,7 @@
           <a:p>
             <a:fld id="{06CA6F89-023D-45A4-BD39-B27B360D9626}" type="datetimeFigureOut">
               <a:rPr lang="en-US" smtClean="0"/>
-              <a:t>12/3/2018</a:t>
+              <a:t>12/5/2018</a:t>
             </a:fld>
             <a:endParaRPr lang="en-US"/>
           </a:p>
@@ -7363,7 +7491,7 @@
           <a:p>
             <a:fld id="{06CA6F89-023D-45A4-BD39-B27B360D9626}" type="datetimeFigureOut">
               <a:rPr lang="en-US" smtClean="0"/>
-              <a:t>12/3/2018</a:t>
+              <a:t>12/5/2018</a:t>
             </a:fld>
             <a:endParaRPr lang="en-US"/>
           </a:p>
@@ -7797,7 +7925,7 @@
           <a:p>
             <a:fld id="{06CA6F89-023D-45A4-BD39-B27B360D9626}" type="datetimeFigureOut">
               <a:rPr lang="en-US" smtClean="0"/>
-              <a:t>12/3/2018</a:t>
+              <a:t>12/5/2018</a:t>
             </a:fld>
             <a:endParaRPr lang="en-US"/>
           </a:p>
@@ -8343,7 +8471,7 @@
           <a:p>
             <a:fld id="{06CA6F89-023D-45A4-BD39-B27B360D9626}" type="datetimeFigureOut">
               <a:rPr lang="en-US" smtClean="0"/>
-              <a:t>12/3/2018</a:t>
+              <a:t>12/5/2018</a:t>
             </a:fld>
             <a:endParaRPr lang="en-US"/>
           </a:p>
@@ -9063,7 +9191,7 @@
           <a:p>
             <a:fld id="{06CA6F89-023D-45A4-BD39-B27B360D9626}" type="datetimeFigureOut">
               <a:rPr lang="en-US" smtClean="0"/>
-              <a:t>12/3/2018</a:t>
+              <a:t>12/5/2018</a:t>
             </a:fld>
             <a:endParaRPr lang="en-US"/>
           </a:p>
@@ -9233,7 +9361,7 @@
           <a:p>
             <a:fld id="{06CA6F89-023D-45A4-BD39-B27B360D9626}" type="datetimeFigureOut">
               <a:rPr lang="en-US" smtClean="0"/>
-              <a:t>12/3/2018</a:t>
+              <a:t>12/5/2018</a:t>
             </a:fld>
             <a:endParaRPr lang="en-US"/>
           </a:p>
@@ -9413,7 +9541,7 @@
           <a:p>
             <a:fld id="{06CA6F89-023D-45A4-BD39-B27B360D9626}" type="datetimeFigureOut">
               <a:rPr lang="en-US" smtClean="0"/>
-              <a:t>12/3/2018</a:t>
+              <a:t>12/5/2018</a:t>
             </a:fld>
             <a:endParaRPr lang="en-US"/>
           </a:p>
@@ -9588,7 +9716,7 @@
           <a:p>
             <a:fld id="{06CA6F89-023D-45A4-BD39-B27B360D9626}" type="datetimeFigureOut">
               <a:rPr lang="en-US" smtClean="0"/>
-              <a:t>12/3/2018</a:t>
+              <a:t>12/5/2018</a:t>
             </a:fld>
             <a:endParaRPr lang="en-US"/>
           </a:p>
@@ -9838,7 +9966,7 @@
           <a:p>
             <a:fld id="{06CA6F89-023D-45A4-BD39-B27B360D9626}" type="datetimeFigureOut">
               <a:rPr lang="en-US" smtClean="0"/>
-              <a:t>12/3/2018</a:t>
+              <a:t>12/5/2018</a:t>
             </a:fld>
             <a:endParaRPr lang="en-US"/>
           </a:p>
@@ -10075,7 +10203,7 @@
           <a:p>
             <a:fld id="{06CA6F89-023D-45A4-BD39-B27B360D9626}" type="datetimeFigureOut">
               <a:rPr lang="en-US" smtClean="0"/>
-              <a:t>12/3/2018</a:t>
+              <a:t>12/5/2018</a:t>
             </a:fld>
             <a:endParaRPr lang="en-US"/>
           </a:p>
@@ -10456,7 +10584,7 @@
           <a:p>
             <a:fld id="{06CA6F89-023D-45A4-BD39-B27B360D9626}" type="datetimeFigureOut">
               <a:rPr lang="en-US" smtClean="0"/>
-              <a:t>12/3/2018</a:t>
+              <a:t>12/5/2018</a:t>
             </a:fld>
             <a:endParaRPr lang="en-US"/>
           </a:p>
@@ -10574,7 +10702,7 @@
           <a:p>
             <a:fld id="{06CA6F89-023D-45A4-BD39-B27B360D9626}" type="datetimeFigureOut">
               <a:rPr lang="en-US" smtClean="0"/>
-              <a:t>12/3/2018</a:t>
+              <a:t>12/5/2018</a:t>
             </a:fld>
             <a:endParaRPr lang="en-US"/>
           </a:p>
@@ -10669,7 +10797,7 @@
           <a:p>
             <a:fld id="{06CA6F89-023D-45A4-BD39-B27B360D9626}" type="datetimeFigureOut">
               <a:rPr lang="en-US" smtClean="0"/>
-              <a:t>12/3/2018</a:t>
+              <a:t>12/5/2018</a:t>
             </a:fld>
             <a:endParaRPr lang="en-US"/>
           </a:p>
@@ -10918,7 +11046,7 @@
           <a:p>
             <a:fld id="{06CA6F89-023D-45A4-BD39-B27B360D9626}" type="datetimeFigureOut">
               <a:rPr lang="en-US" smtClean="0"/>
-              <a:t>12/3/2018</a:t>
+              <a:t>12/5/2018</a:t>
             </a:fld>
             <a:endParaRPr lang="en-US"/>
           </a:p>
@@ -11198,7 +11326,7 @@
           <a:p>
             <a:fld id="{06CA6F89-023D-45A4-BD39-B27B360D9626}" type="datetimeFigureOut">
               <a:rPr lang="en-US" smtClean="0"/>
-              <a:t>12/3/2018</a:t>
+              <a:t>12/5/2018</a:t>
             </a:fld>
             <a:endParaRPr lang="en-US"/>
           </a:p>
@@ -11321,7 +11449,7 @@
           <a:noFill/>
           <a:extLst>
             <a:ext uri="{909E8E84-426E-40dd-AFC4-6F175D3DCCD1}">
-              <a14:hiddenFill xmlns:a14="http://schemas.microsoft.com/office/drawing/2010/main" xmlns="">
+              <a14:hiddenFill xmlns="" xmlns:a14="http://schemas.microsoft.com/office/drawing/2010/main">
                 <a:solidFill>
                   <a:srgbClr val="FFFFFF"/>
                 </a:solidFill>
@@ -11395,7 +11523,7 @@
               </a:ln>
               <a:extLst>
                 <a:ext uri="{91240B29-F687-4f45-9708-019B960494DF}">
-                  <a14:hiddenLine xmlns:a14="http://schemas.microsoft.com/office/drawing/2010/main" xmlns="" w="9525">
+                  <a14:hiddenLine xmlns="" xmlns:a14="http://schemas.microsoft.com/office/drawing/2010/main" w="9525">
                     <a:solidFill>
                       <a:srgbClr val="000000"/>
                     </a:solidFill>
@@ -11485,7 +11613,7 @@
               </a:ln>
               <a:extLst>
                 <a:ext uri="{91240B29-F687-4f45-9708-019B960494DF}">
-                  <a14:hiddenLine xmlns:a14="http://schemas.microsoft.com/office/drawing/2010/main" xmlns="" w="9525">
+                  <a14:hiddenLine xmlns="" xmlns:a14="http://schemas.microsoft.com/office/drawing/2010/main" w="9525">
                     <a:solidFill>
                       <a:srgbClr val="000000"/>
                     </a:solidFill>
@@ -11575,7 +11703,7 @@
               </a:ln>
               <a:extLst>
                 <a:ext uri="{91240B29-F687-4f45-9708-019B960494DF}">
-                  <a14:hiddenLine xmlns:a14="http://schemas.microsoft.com/office/drawing/2010/main" xmlns="" w="9525">
+                  <a14:hiddenLine xmlns="" xmlns:a14="http://schemas.microsoft.com/office/drawing/2010/main" w="9525">
                     <a:solidFill>
                       <a:srgbClr val="000000"/>
                     </a:solidFill>
@@ -11637,7 +11765,7 @@
               </a:ln>
               <a:extLst>
                 <a:ext uri="{91240B29-F687-4f45-9708-019B960494DF}">
-                  <a14:hiddenLine xmlns:a14="http://schemas.microsoft.com/office/drawing/2010/main" xmlns="" w="9525">
+                  <a14:hiddenLine xmlns="" xmlns:a14="http://schemas.microsoft.com/office/drawing/2010/main" w="9525">
                     <a:solidFill>
                       <a:srgbClr val="000000"/>
                     </a:solidFill>
@@ -11727,7 +11855,7 @@
               </a:ln>
               <a:extLst>
                 <a:ext uri="{91240B29-F687-4f45-9708-019B960494DF}">
-                  <a14:hiddenLine xmlns:a14="http://schemas.microsoft.com/office/drawing/2010/main" xmlns="" w="9525">
+                  <a14:hiddenLine xmlns="" xmlns:a14="http://schemas.microsoft.com/office/drawing/2010/main" w="9525">
                     <a:solidFill>
                       <a:srgbClr val="000000"/>
                     </a:solidFill>
@@ -11789,7 +11917,7 @@
               </a:ln>
               <a:extLst>
                 <a:ext uri="{91240B29-F687-4f45-9708-019B960494DF}">
-                  <a14:hiddenLine xmlns:a14="http://schemas.microsoft.com/office/drawing/2010/main" xmlns="" w="9525">
+                  <a14:hiddenLine xmlns="" xmlns:a14="http://schemas.microsoft.com/office/drawing/2010/main" w="9525">
                     <a:solidFill>
                       <a:srgbClr val="000000"/>
                     </a:solidFill>
@@ -11851,7 +11979,7 @@
               </a:ln>
               <a:extLst>
                 <a:ext uri="{91240B29-F687-4f45-9708-019B960494DF}">
-                  <a14:hiddenLine xmlns:a14="http://schemas.microsoft.com/office/drawing/2010/main" xmlns="" w="9525">
+                  <a14:hiddenLine xmlns="" xmlns:a14="http://schemas.microsoft.com/office/drawing/2010/main" w="9525">
                     <a:solidFill>
                       <a:srgbClr val="000000"/>
                     </a:solidFill>
@@ -11941,7 +12069,7 @@
               </a:ln>
               <a:extLst>
                 <a:ext uri="{91240B29-F687-4f45-9708-019B960494DF}">
-                  <a14:hiddenLine xmlns:a14="http://schemas.microsoft.com/office/drawing/2010/main" xmlns="" w="9525">
+                  <a14:hiddenLine xmlns="" xmlns:a14="http://schemas.microsoft.com/office/drawing/2010/main" w="9525">
                     <a:solidFill>
                       <a:srgbClr val="000000"/>
                     </a:solidFill>
@@ -12031,7 +12159,7 @@
               </a:ln>
               <a:extLst>
                 <a:ext uri="{91240B29-F687-4f45-9708-019B960494DF}">
-                  <a14:hiddenLine xmlns:a14="http://schemas.microsoft.com/office/drawing/2010/main" xmlns="" w="9525">
+                  <a14:hiddenLine xmlns="" xmlns:a14="http://schemas.microsoft.com/office/drawing/2010/main" w="9525">
                     <a:solidFill>
                       <a:srgbClr val="000000"/>
                     </a:solidFill>
@@ -12093,7 +12221,7 @@
               </a:ln>
               <a:extLst>
                 <a:ext uri="{91240B29-F687-4f45-9708-019B960494DF}">
-                  <a14:hiddenLine xmlns:a14="http://schemas.microsoft.com/office/drawing/2010/main" xmlns="" w="9525">
+                  <a14:hiddenLine xmlns="" xmlns:a14="http://schemas.microsoft.com/office/drawing/2010/main" w="9525">
                     <a:solidFill>
                       <a:srgbClr val="000000"/>
                     </a:solidFill>
@@ -12203,7 +12331,7 @@
               </a:ln>
               <a:extLst>
                 <a:ext uri="{91240B29-F687-4f45-9708-019B960494DF}">
-                  <a14:hiddenLine xmlns:a14="http://schemas.microsoft.com/office/drawing/2010/main" xmlns="" w="9525">
+                  <a14:hiddenLine xmlns="" xmlns:a14="http://schemas.microsoft.com/office/drawing/2010/main" w="9525">
                     <a:solidFill>
                       <a:srgbClr val="000000"/>
                     </a:solidFill>
@@ -12287,7 +12415,7 @@
               </a:ln>
               <a:extLst>
                 <a:ext uri="{91240B29-F687-4f45-9708-019B960494DF}">
-                  <a14:hiddenLine xmlns:a14="http://schemas.microsoft.com/office/drawing/2010/main" xmlns="" w="9525">
+                  <a14:hiddenLine xmlns="" xmlns:a14="http://schemas.microsoft.com/office/drawing/2010/main" w="9525">
                     <a:solidFill>
                       <a:srgbClr val="000000"/>
                     </a:solidFill>
@@ -12349,7 +12477,7 @@
               </a:ln>
               <a:extLst>
                 <a:ext uri="{91240B29-F687-4f45-9708-019B960494DF}">
-                  <a14:hiddenLine xmlns:a14="http://schemas.microsoft.com/office/drawing/2010/main" xmlns="" w="9525">
+                  <a14:hiddenLine xmlns="" xmlns:a14="http://schemas.microsoft.com/office/drawing/2010/main" w="9525">
                     <a:solidFill>
                       <a:srgbClr val="000000"/>
                     </a:solidFill>
@@ -12411,7 +12539,7 @@
               </a:ln>
               <a:extLst>
                 <a:ext uri="{91240B29-F687-4f45-9708-019B960494DF}">
-                  <a14:hiddenLine xmlns:a14="http://schemas.microsoft.com/office/drawing/2010/main" xmlns="" w="9525">
+                  <a14:hiddenLine xmlns="" xmlns:a14="http://schemas.microsoft.com/office/drawing/2010/main" w="9525">
                     <a:solidFill>
                       <a:srgbClr val="000000"/>
                     </a:solidFill>
@@ -12501,7 +12629,7 @@
               </a:ln>
               <a:extLst>
                 <a:ext uri="{91240B29-F687-4f45-9708-019B960494DF}">
-                  <a14:hiddenLine xmlns:a14="http://schemas.microsoft.com/office/drawing/2010/main" xmlns="" w="9525">
+                  <a14:hiddenLine xmlns="" xmlns:a14="http://schemas.microsoft.com/office/drawing/2010/main" w="9525">
                     <a:solidFill>
                       <a:srgbClr val="000000"/>
                     </a:solidFill>
@@ -12535,7 +12663,7 @@
               </a:ln>
               <a:extLst>
                 <a:ext uri="{91240B29-F687-4f45-9708-019B960494DF}">
-                  <a14:hiddenLine xmlns:a14="http://schemas.microsoft.com/office/drawing/2010/main" xmlns="" w="9525">
+                  <a14:hiddenLine xmlns="" xmlns:a14="http://schemas.microsoft.com/office/drawing/2010/main" w="9525">
                     <a:solidFill>
                       <a:srgbClr val="000000"/>
                     </a:solidFill>
@@ -12600,7 +12728,7 @@
               </a:ln>
               <a:extLst>
                 <a:ext uri="{91240B29-F687-4f45-9708-019B960494DF}">
-                  <a14:hiddenLine xmlns:a14="http://schemas.microsoft.com/office/drawing/2010/main" xmlns="" w="9525">
+                  <a14:hiddenLine xmlns="" xmlns:a14="http://schemas.microsoft.com/office/drawing/2010/main" w="9525">
                     <a:solidFill>
                       <a:srgbClr val="000000"/>
                     </a:solidFill>
@@ -12690,7 +12818,7 @@
               </a:ln>
               <a:extLst>
                 <a:ext uri="{91240B29-F687-4f45-9708-019B960494DF}">
-                  <a14:hiddenLine xmlns:a14="http://schemas.microsoft.com/office/drawing/2010/main" xmlns="" w="9525">
+                  <a14:hiddenLine xmlns="" xmlns:a14="http://schemas.microsoft.com/office/drawing/2010/main" w="9525">
                     <a:solidFill>
                       <a:srgbClr val="000000"/>
                     </a:solidFill>
@@ -12752,7 +12880,7 @@
               </a:ln>
               <a:extLst>
                 <a:ext uri="{91240B29-F687-4f45-9708-019B960494DF}">
-                  <a14:hiddenLine xmlns:a14="http://schemas.microsoft.com/office/drawing/2010/main" xmlns="" w="9525">
+                  <a14:hiddenLine xmlns="" xmlns:a14="http://schemas.microsoft.com/office/drawing/2010/main" w="9525">
                     <a:solidFill>
                       <a:srgbClr val="000000"/>
                     </a:solidFill>
@@ -12842,7 +12970,7 @@
               </a:ln>
               <a:extLst>
                 <a:ext uri="{91240B29-F687-4f45-9708-019B960494DF}">
-                  <a14:hiddenLine xmlns:a14="http://schemas.microsoft.com/office/drawing/2010/main" xmlns="" w="9525">
+                  <a14:hiddenLine xmlns="" xmlns:a14="http://schemas.microsoft.com/office/drawing/2010/main" w="9525">
                     <a:solidFill>
                       <a:srgbClr val="000000"/>
                     </a:solidFill>
@@ -12907,7 +13035,7 @@
               </a:ln>
               <a:extLst>
                 <a:ext uri="{91240B29-F687-4f45-9708-019B960494DF}">
-                  <a14:hiddenLine xmlns:a14="http://schemas.microsoft.com/office/drawing/2010/main" xmlns="" w="9525">
+                  <a14:hiddenLine xmlns="" xmlns:a14="http://schemas.microsoft.com/office/drawing/2010/main" w="9525">
                     <a:solidFill>
                       <a:srgbClr val="000000"/>
                     </a:solidFill>
@@ -12969,7 +13097,7 @@
               </a:ln>
               <a:extLst>
                 <a:ext uri="{91240B29-F687-4f45-9708-019B960494DF}">
-                  <a14:hiddenLine xmlns:a14="http://schemas.microsoft.com/office/drawing/2010/main" xmlns="" w="9525">
+                  <a14:hiddenLine xmlns="" xmlns:a14="http://schemas.microsoft.com/office/drawing/2010/main" w="9525">
                     <a:solidFill>
                       <a:srgbClr val="000000"/>
                     </a:solidFill>
@@ -13059,7 +13187,7 @@
               </a:ln>
               <a:extLst>
                 <a:ext uri="{91240B29-F687-4f45-9708-019B960494DF}">
-                  <a14:hiddenLine xmlns:a14="http://schemas.microsoft.com/office/drawing/2010/main" xmlns="" w="9525">
+                  <a14:hiddenLine xmlns="" xmlns:a14="http://schemas.microsoft.com/office/drawing/2010/main" w="9525">
                     <a:solidFill>
                       <a:srgbClr val="000000"/>
                     </a:solidFill>
@@ -13149,7 +13277,7 @@
               </a:ln>
               <a:extLst>
                 <a:ext uri="{91240B29-F687-4f45-9708-019B960494DF}">
-                  <a14:hiddenLine xmlns:a14="http://schemas.microsoft.com/office/drawing/2010/main" xmlns="" w="9525">
+                  <a14:hiddenLine xmlns="" xmlns:a14="http://schemas.microsoft.com/office/drawing/2010/main" w="9525">
                     <a:solidFill>
                       <a:srgbClr val="000000"/>
                     </a:solidFill>
@@ -13214,7 +13342,7 @@
               </a:ln>
               <a:extLst>
                 <a:ext uri="{91240B29-F687-4f45-9708-019B960494DF}">
-                  <a14:hiddenLine xmlns:a14="http://schemas.microsoft.com/office/drawing/2010/main" xmlns="" w="9525">
+                  <a14:hiddenLine xmlns="" xmlns:a14="http://schemas.microsoft.com/office/drawing/2010/main" w="9525">
                     <a:solidFill>
                       <a:srgbClr val="000000"/>
                     </a:solidFill>
@@ -13334,7 +13462,7 @@
               </a:ln>
               <a:extLst>
                 <a:ext uri="{91240B29-F687-4f45-9708-019B960494DF}">
-                  <a14:hiddenLine xmlns:a14="http://schemas.microsoft.com/office/drawing/2010/main" xmlns="" w="9525">
+                  <a14:hiddenLine xmlns="" xmlns:a14="http://schemas.microsoft.com/office/drawing/2010/main" w="9525">
                     <a:solidFill>
                       <a:srgbClr val="000000"/>
                     </a:solidFill>
@@ -13415,7 +13543,7 @@
               </a:ln>
               <a:extLst>
                 <a:ext uri="{91240B29-F687-4f45-9708-019B960494DF}">
-                  <a14:hiddenLine xmlns:a14="http://schemas.microsoft.com/office/drawing/2010/main" xmlns="" w="9525">
+                  <a14:hiddenLine xmlns="" xmlns:a14="http://schemas.microsoft.com/office/drawing/2010/main" w="9525">
                     <a:solidFill>
                       <a:srgbClr val="000000"/>
                     </a:solidFill>
@@ -13530,7 +13658,7 @@
               </a:ln>
               <a:extLst>
                 <a:ext uri="{91240B29-F687-4f45-9708-019B960494DF}">
-                  <a14:hiddenLine xmlns:a14="http://schemas.microsoft.com/office/drawing/2010/main" xmlns="" w="9525">
+                  <a14:hiddenLine xmlns="" xmlns:a14="http://schemas.microsoft.com/office/drawing/2010/main" w="9525">
                     <a:solidFill>
                       <a:srgbClr val="000000"/>
                     </a:solidFill>
@@ -13620,7 +13748,7 @@
               </a:ln>
               <a:extLst>
                 <a:ext uri="{91240B29-F687-4f45-9708-019B960494DF}">
-                  <a14:hiddenLine xmlns:a14="http://schemas.microsoft.com/office/drawing/2010/main" xmlns="" w="9525">
+                  <a14:hiddenLine xmlns="" xmlns:a14="http://schemas.microsoft.com/office/drawing/2010/main" w="9525">
                     <a:solidFill>
                       <a:srgbClr val="000000"/>
                     </a:solidFill>
@@ -13685,7 +13813,7 @@
               </a:ln>
               <a:extLst>
                 <a:ext uri="{91240B29-F687-4f45-9708-019B960494DF}">
-                  <a14:hiddenLine xmlns:a14="http://schemas.microsoft.com/office/drawing/2010/main" xmlns="" w="9525">
+                  <a14:hiddenLine xmlns="" xmlns:a14="http://schemas.microsoft.com/office/drawing/2010/main" w="9525">
                     <a:solidFill>
                       <a:srgbClr val="000000"/>
                     </a:solidFill>
@@ -13775,7 +13903,7 @@
               </a:ln>
               <a:extLst>
                 <a:ext uri="{91240B29-F687-4f45-9708-019B960494DF}">
-                  <a14:hiddenLine xmlns:a14="http://schemas.microsoft.com/office/drawing/2010/main" xmlns="" w="9525">
+                  <a14:hiddenLine xmlns="" xmlns:a14="http://schemas.microsoft.com/office/drawing/2010/main" w="9525">
                     <a:solidFill>
                       <a:srgbClr val="000000"/>
                     </a:solidFill>
@@ -13843,7 +13971,7 @@
               </a:ln>
               <a:extLst>
                 <a:ext uri="{91240B29-F687-4f45-9708-019B960494DF}">
-                  <a14:hiddenLine xmlns:a14="http://schemas.microsoft.com/office/drawing/2010/main" xmlns="" w="9525">
+                  <a14:hiddenLine xmlns="" xmlns:a14="http://schemas.microsoft.com/office/drawing/2010/main" w="9525">
                     <a:solidFill>
                       <a:srgbClr val="000000"/>
                     </a:solidFill>
@@ -13933,7 +14061,7 @@
               </a:ln>
               <a:extLst>
                 <a:ext uri="{91240B29-F687-4f45-9708-019B960494DF}">
-                  <a14:hiddenLine xmlns:a14="http://schemas.microsoft.com/office/drawing/2010/main" xmlns="" w="9525">
+                  <a14:hiddenLine xmlns="" xmlns:a14="http://schemas.microsoft.com/office/drawing/2010/main" w="9525">
                     <a:solidFill>
                       <a:srgbClr val="000000"/>
                     </a:solidFill>
@@ -14001,7 +14129,7 @@
               </a:ln>
               <a:extLst>
                 <a:ext uri="{91240B29-F687-4f45-9708-019B960494DF}">
-                  <a14:hiddenLine xmlns:a14="http://schemas.microsoft.com/office/drawing/2010/main" xmlns="" w="9525">
+                  <a14:hiddenLine xmlns="" xmlns:a14="http://schemas.microsoft.com/office/drawing/2010/main" w="9525">
                     <a:solidFill>
                       <a:srgbClr val="000000"/>
                     </a:solidFill>
@@ -14091,7 +14219,7 @@
               </a:ln>
               <a:extLst>
                 <a:ext uri="{91240B29-F687-4f45-9708-019B960494DF}">
-                  <a14:hiddenLine xmlns:a14="http://schemas.microsoft.com/office/drawing/2010/main" xmlns="" w="9525">
+                  <a14:hiddenLine xmlns="" xmlns:a14="http://schemas.microsoft.com/office/drawing/2010/main" w="9525">
                     <a:solidFill>
                       <a:srgbClr val="000000"/>
                     </a:solidFill>
@@ -14125,7 +14253,7 @@
               </a:ln>
               <a:extLst>
                 <a:ext uri="{91240B29-F687-4f45-9708-019B960494DF}">
-                  <a14:hiddenLine xmlns:a14="http://schemas.microsoft.com/office/drawing/2010/main" xmlns="" w="9525">
+                  <a14:hiddenLine xmlns="" xmlns:a14="http://schemas.microsoft.com/office/drawing/2010/main" w="9525">
                     <a:solidFill>
                       <a:srgbClr val="000000"/>
                     </a:solidFill>
@@ -14265,7 +14393,7 @@
           <a:p>
             <a:fld id="{06CA6F89-023D-45A4-BD39-B27B360D9626}" type="datetimeFigureOut">
               <a:rPr lang="en-US" smtClean="0"/>
-              <a:t>12/3/2018</a:t>
+              <a:t>12/5/2018</a:t>
             </a:fld>
             <a:endParaRPr lang="en-US"/>
           </a:p>
@@ -15001,60 +15129,66 @@
           <a:bodyPr/>
           <a:lstStyle/>
           <a:p>
+            <a:pPr algn="ctr"/>
             <a:r>
               <a:rPr lang="en-US" dirty="0" smtClean="0"/>
-              <a:t>Data execution prevention</a:t>
+              <a:t>BYPASS SAFE EXCEPTION HANDLING</a:t>
             </a:r>
             <a:endParaRPr lang="en-US" dirty="0"/>
           </a:p>
         </p:txBody>
       </p:sp>
-      <p:sp>
-        <p:nvSpPr>
-          <p:cNvPr id="3" name="Content Placeholder 2"/>
-          <p:cNvSpPr>
-            <a:spLocks noGrp="1"/>
-          </p:cNvSpPr>
-          <p:nvPr>
-            <p:ph idx="1"/>
-          </p:nvPr>
-        </p:nvSpPr>
-        <p:spPr/>
-        <p:txBody>
-          <a:bodyPr/>
-          <a:lstStyle/>
-          <a:p>
-            <a:r>
-              <a:rPr lang="en-US" b="1" dirty="0" smtClean="0"/>
-              <a:t>So we can’t place our shellcode in the stack to be execute by our exception handler, so we will do a “ret2lib” which essentially means we want to point to the “system” function in a library the program imported</a:t>
-            </a:r>
-          </a:p>
-          <a:p>
-            <a:r>
-              <a:rPr lang="en-US" b="1" dirty="0" smtClean="0"/>
-              <a:t>Segments in this library can be executed so we will return to “system”</a:t>
-            </a:r>
-            <a:endParaRPr lang="en-US" b="1" dirty="0"/>
-          </a:p>
-        </p:txBody>
-      </p:sp>
+      <p:pic>
+        <p:nvPicPr>
+          <p:cNvPr id="1026" name="Picture 2" descr="image"/>
+          <p:cNvPicPr>
+            <a:picLocks noChangeAspect="1" noChangeArrowheads="1"/>
+          </p:cNvPicPr>
+          <p:nvPr/>
+        </p:nvPicPr>
+        <p:blipFill>
+          <a:blip r:embed="rId3">
+            <a:extLst>
+              <a:ext uri="{28A0092B-C50C-407E-A947-70E740481C1C}">
+                <a14:useLocalDpi xmlns:a14="http://schemas.microsoft.com/office/drawing/2010/main" val="0"/>
+              </a:ext>
+            </a:extLst>
+          </a:blip>
+          <a:srcRect/>
+          <a:stretch>
+            <a:fillRect/>
+          </a:stretch>
+        </p:blipFill>
+        <p:spPr bwMode="auto">
+          <a:xfrm>
+            <a:off x="2402834" y="1684233"/>
+            <a:ext cx="7383155" cy="4934856"/>
+          </a:xfrm>
+          <a:prstGeom prst="rect">
+            <a:avLst/>
+          </a:prstGeom>
+          <a:noFill/>
+          <a:extLst>
+            <a:ext uri="{909E8E84-426E-40DD-AFC4-6F175D3DCCD1}">
+              <a14:hiddenFill xmlns:a14="http://schemas.microsoft.com/office/drawing/2010/main">
+                <a:solidFill>
+                  <a:srgbClr val="FFFFFF"/>
+                </a:solidFill>
+              </a14:hiddenFill>
+            </a:ext>
+          </a:extLst>
+        </p:spPr>
+      </p:pic>
     </p:spTree>
     <p:extLst>
       <p:ext uri="{BB962C8B-B14F-4D97-AF65-F5344CB8AC3E}">
-        <p14:creationId xmlns:p14="http://schemas.microsoft.com/office/powerpoint/2010/main" val="4291708717"/>
+        <p14:creationId xmlns:p14="http://schemas.microsoft.com/office/powerpoint/2010/main" val="2301954294"/>
       </p:ext>
     </p:extLst>
   </p:cSld>
   <p:clrMapOvr>
     <a:masterClrMapping/>
   </p:clrMapOvr>
-  <p:timing>
-    <p:tnLst>
-      <p:par>
-        <p:cTn id="1" dur="indefinite" restart="never" nodeType="tmRoot"/>
-      </p:par>
-    </p:tnLst>
-  </p:timing>
 </p:sld>
 </file>
 
@@ -15092,7 +15226,7 @@
           <a:p>
             <a:r>
               <a:rPr lang="en-US" dirty="0" smtClean="0"/>
-              <a:t>Address space layout randomization</a:t>
+              <a:t>Data execution prevention</a:t>
             </a:r>
             <a:endParaRPr lang="en-US" dirty="0"/>
           </a:p>
@@ -15110,36 +15244,19 @@
         </p:nvSpPr>
         <p:spPr/>
         <p:txBody>
-          <a:bodyPr>
-            <a:normAutofit lnSpcReduction="10000"/>
-          </a:bodyPr>
+          <a:bodyPr/>
           <a:lstStyle/>
           <a:p>
             <a:r>
               <a:rPr lang="en-US" b="1" dirty="0" smtClean="0"/>
-              <a:t>But wait there is more… ASLR randomizes the addresses so the system call is always in a different place</a:t>
+              <a:t>So we can’t place our shellcode in the stack to be execute by our exception handler, so we will do a “ret2lib” which essentially means we want to point to the “system” function in a library the program imported</a:t>
             </a:r>
           </a:p>
           <a:p>
             <a:r>
               <a:rPr lang="en-US" b="1" dirty="0" smtClean="0"/>
-              <a:t>You can use other format string vulnerabilities to leak memory addresses to calculate the offset</a:t>
-            </a:r>
-          </a:p>
-          <a:p>
-            <a:r>
-              <a:rPr lang="en-US" b="1" dirty="0" smtClean="0"/>
-              <a:t>Or we could use a module not compiled with ASLR</a:t>
-            </a:r>
-          </a:p>
-          <a:p>
-            <a:pPr lvl="1"/>
-            <a:r>
-              <a:rPr lang="en-US" b="1" dirty="0" smtClean="0"/>
-              <a:t>I found a module not compiled with ASLR, found a memory address that could jump to my stack pointer, triggered an exception, and had that exception point to the system call</a:t>
-            </a:r>
-          </a:p>
-          <a:p>
+              <a:t>Segments in this library can be executed so we will return to “system”</a:t>
+            </a:r>
             <a:endParaRPr lang="en-US" b="1" dirty="0"/>
           </a:p>
         </p:txBody>
@@ -15147,7 +15264,7 @@
     </p:spTree>
     <p:extLst>
       <p:ext uri="{BB962C8B-B14F-4D97-AF65-F5344CB8AC3E}">
-        <p14:creationId xmlns:p14="http://schemas.microsoft.com/office/powerpoint/2010/main" val="66029853"/>
+        <p14:creationId xmlns:p14="http://schemas.microsoft.com/office/powerpoint/2010/main" val="4291708717"/>
       </p:ext>
     </p:extLst>
   </p:cSld>
@@ -15198,6 +15315,112 @@
           <a:p>
             <a:r>
               <a:rPr lang="en-US" dirty="0" smtClean="0"/>
+              <a:t>Address space layout randomization</a:t>
+            </a:r>
+            <a:endParaRPr lang="en-US" dirty="0"/>
+          </a:p>
+        </p:txBody>
+      </p:sp>
+      <p:sp>
+        <p:nvSpPr>
+          <p:cNvPr id="3" name="Content Placeholder 2"/>
+          <p:cNvSpPr>
+            <a:spLocks noGrp="1"/>
+          </p:cNvSpPr>
+          <p:nvPr>
+            <p:ph idx="1"/>
+          </p:nvPr>
+        </p:nvSpPr>
+        <p:spPr/>
+        <p:txBody>
+          <a:bodyPr>
+            <a:normAutofit lnSpcReduction="10000"/>
+          </a:bodyPr>
+          <a:lstStyle/>
+          <a:p>
+            <a:r>
+              <a:rPr lang="en-US" b="1" dirty="0" smtClean="0"/>
+              <a:t>But wait there is more… ASLR randomizes the addresses so the system call is always in a different place</a:t>
+            </a:r>
+          </a:p>
+          <a:p>
+            <a:r>
+              <a:rPr lang="en-US" b="1" dirty="0" smtClean="0"/>
+              <a:t>You can use other format string vulnerabilities to leak memory addresses to calculate the offset</a:t>
+            </a:r>
+          </a:p>
+          <a:p>
+            <a:r>
+              <a:rPr lang="en-US" b="1" dirty="0" smtClean="0"/>
+              <a:t>Or we could use a module not compiled with ASLR</a:t>
+            </a:r>
+          </a:p>
+          <a:p>
+            <a:pPr lvl="1"/>
+            <a:r>
+              <a:rPr lang="en-US" b="1" dirty="0" smtClean="0"/>
+              <a:t>I found a module not compiled with ASLR, found a memory address that could jump to my stack pointer, triggered an exception, and had that exception point to the system call</a:t>
+            </a:r>
+          </a:p>
+          <a:p>
+            <a:endParaRPr lang="en-US" b="1" dirty="0"/>
+          </a:p>
+        </p:txBody>
+      </p:sp>
+    </p:spTree>
+    <p:extLst>
+      <p:ext uri="{BB962C8B-B14F-4D97-AF65-F5344CB8AC3E}">
+        <p14:creationId xmlns:p14="http://schemas.microsoft.com/office/powerpoint/2010/main" val="66029853"/>
+      </p:ext>
+    </p:extLst>
+  </p:cSld>
+  <p:clrMapOvr>
+    <a:masterClrMapping/>
+  </p:clrMapOvr>
+  <p:timing>
+    <p:tnLst>
+      <p:par>
+        <p:cTn id="1" dur="indefinite" restart="never" nodeType="tmRoot"/>
+      </p:par>
+    </p:tnLst>
+  </p:timing>
+</p:sld>
+</file>
+
+<file path=ppt/slides/slide14.xml><?xml version="1.0" encoding="utf-8"?>
+<p:sld xmlns:a="http://schemas.openxmlformats.org/drawingml/2006/main" xmlns:r="http://schemas.openxmlformats.org/officeDocument/2006/relationships" xmlns:p="http://schemas.openxmlformats.org/presentationml/2006/main">
+  <p:cSld>
+    <p:spTree>
+      <p:nvGrpSpPr>
+        <p:cNvPr id="1" name=""/>
+        <p:cNvGrpSpPr/>
+        <p:nvPr/>
+      </p:nvGrpSpPr>
+      <p:grpSpPr>
+        <a:xfrm>
+          <a:off x="0" y="0"/>
+          <a:ext cx="0" cy="0"/>
+          <a:chOff x="0" y="0"/>
+          <a:chExt cx="0" cy="0"/>
+        </a:xfrm>
+      </p:grpSpPr>
+      <p:sp>
+        <p:nvSpPr>
+          <p:cNvPr id="2" name="Title 1"/>
+          <p:cNvSpPr>
+            <a:spLocks noGrp="1"/>
+          </p:cNvSpPr>
+          <p:nvPr>
+            <p:ph type="title"/>
+          </p:nvPr>
+        </p:nvSpPr>
+        <p:spPr/>
+        <p:txBody>
+          <a:bodyPr/>
+          <a:lstStyle/>
+          <a:p>
+            <a:r>
+              <a:rPr lang="en-US" dirty="0" smtClean="0"/>
               <a:t>Materials produced</a:t>
             </a:r>
             <a:endParaRPr lang="en-US" dirty="0"/>
@@ -15271,7 +15494,7 @@
 </p:sld>
 </file>
 
-<file path=ppt/slides/slide14.xml><?xml version="1.0" encoding="utf-8"?>
+<file path=ppt/slides/slide15.xml><?xml version="1.0" encoding="utf-8"?>
 <p:sld xmlns:a="http://schemas.openxmlformats.org/drawingml/2006/main" xmlns:r="http://schemas.openxmlformats.org/officeDocument/2006/relationships" xmlns:p="http://schemas.openxmlformats.org/presentationml/2006/main">
   <p:cSld>
     <p:spTree>
@@ -17231,7 +17454,7 @@
 </file>
 
 <file path=customXml/itemProps2.xml><?xml version="1.0" encoding="utf-8"?>
-<ds:datastoreItem xmlns:ds="http://schemas.openxmlformats.org/officeDocument/2006/customXml" ds:itemID="{62460803-662F-4B8F-8CEE-A997359B49DE}">
+<ds:datastoreItem xmlns:ds="http://schemas.openxmlformats.org/officeDocument/2006/customXml" ds:itemID="{EA30DFC5-D203-4503-B0B3-52588B6472D7}">
   <ds:schemaRefs>
     <ds:schemaRef ds:uri="http://www.w3.org/2001/XMLSchema"/>
     <ds:schemaRef ds:uri="http://www.boldonjames.com/2008/01/sie/internal/label"/>

</xml_diff>